<commit_message>
Added MlogCServer cus modSecurity logs are a pain in the ass. Changed ShareMem functions to work as a lib. First test of building a RL environment (Note: these are just tests, not even working or real)
</commit_message>
<xml_diff>
--- a/IH3A-Intelligent-Hacking-Auto-Attacking-Agent-Framework.pptx
+++ b/IH3A-Intelligent-Hacking-Auto-Attacking-Agent-Framework.pptx
@@ -5,7 +5,7 @@
     <p:sldMasterId id="2147483648" r:id="rId1"/>
   </p:sldMasterIdLst>
   <p:notesMasterIdLst>
-    <p:notesMasterId r:id="rId11"/>
+    <p:notesMasterId r:id="rId10"/>
   </p:notesMasterIdLst>
   <p:sldIdLst>
     <p:sldId id="256" r:id="rId2"/>
@@ -15,19 +15,21 @@
     <p:sldId id="259" r:id="rId6"/>
     <p:sldId id="260" r:id="rId7"/>
     <p:sldId id="261" r:id="rId8"/>
-    <p:sldId id="262" r:id="rId9"/>
-    <p:sldId id="263" r:id="rId10"/>
+    <p:sldId id="263" r:id="rId9"/>
   </p:sldIdLst>
   <p:sldSz cx="14630400" cy="8229600"/>
   <p:notesSz cx="8229600" cy="14630400"/>
   <p:embeddedFontLst>
     <p:embeddedFont>
       <p:font typeface="Montserrat Bold" panose="00000800000000000000" pitchFamily="2" charset="0"/>
-      <p:bold r:id="rId12"/>
+      <p:bold r:id="rId11"/>
     </p:embeddedFont>
     <p:embeddedFont>
       <p:font typeface="Source Sans Pro" panose="020B0503030403020204" pitchFamily="34" charset="0"/>
-      <p:regular r:id="rId13"/>
+      <p:regular r:id="rId12"/>
+      <p:bold r:id="rId13"/>
+      <p:italic r:id="rId14"/>
+      <p:boldItalic r:id="rId15"/>
     </p:embeddedFont>
   </p:embeddedFontLst>
   <p:defaultTextStyle>
@@ -936,90 +938,6 @@
             <a:fld id="{F7021451-1387-4CA6-816F-3879F97B5CBC}" type="slidenum">
               <a:rPr lang="en-US"/>
               <a:t>8</a:t>
-            </a:fld>
-            <a:endParaRPr lang="en-US"/>
-          </a:p>
-        </p:txBody>
-      </p:sp>
-    </p:spTree>
-    <p:extLst>
-      <p:ext uri="{BB962C8B-B14F-4D97-AF65-F5344CB8AC3E}">
-        <p14:creationId xmlns:p14="http://schemas.microsoft.com/office/powerpoint/2010/main" val="1024086991"/>
-      </p:ext>
-    </p:extLst>
-  </p:cSld>
-  <p:clrMapOvr>
-    <a:masterClrMapping/>
-  </p:clrMapOvr>
-</p:notes>
-</file>
-
-<file path=ppt/notesSlides/notesSlide9.xml><?xml version="1.0" encoding="utf-8"?>
-<p:notes xmlns:a="http://schemas.openxmlformats.org/drawingml/2006/main" xmlns:r="http://schemas.openxmlformats.org/officeDocument/2006/relationships" xmlns:p="http://schemas.openxmlformats.org/presentationml/2006/main">
-  <p:cSld>
-    <p:spTree>
-      <p:nvGrpSpPr>
-        <p:cNvPr id="1" name=""/>
-        <p:cNvGrpSpPr/>
-        <p:nvPr/>
-      </p:nvGrpSpPr>
-      <p:grpSpPr>
-        <a:xfrm>
-          <a:off x="0" y="0"/>
-          <a:ext cx="0" cy="0"/>
-          <a:chOff x="0" y="0"/>
-          <a:chExt cx="0" cy="0"/>
-        </a:xfrm>
-      </p:grpSpPr>
-      <p:sp>
-        <p:nvSpPr>
-          <p:cNvPr id="2" name="Slide Image Placeholder 1"/>
-          <p:cNvSpPr>
-            <a:spLocks noGrp="1" noRot="1" noChangeAspect="1"/>
-          </p:cNvSpPr>
-          <p:nvPr>
-            <p:ph type="sldImg"/>
-          </p:nvPr>
-        </p:nvSpPr>
-        <p:spPr/>
-      </p:sp>
-      <p:sp>
-        <p:nvSpPr>
-          <p:cNvPr id="3" name="Notes Placeholder 2"/>
-          <p:cNvSpPr>
-            <a:spLocks noGrp="1"/>
-          </p:cNvSpPr>
-          <p:nvPr>
-            <p:ph type="body" idx="1"/>
-          </p:nvPr>
-        </p:nvSpPr>
-        <p:spPr/>
-        <p:txBody>
-          <a:bodyPr/>
-          <a:lstStyle/>
-          <a:p>
-            <a:endParaRPr lang="en-US" dirty="0"/>
-          </a:p>
-        </p:txBody>
-      </p:sp>
-      <p:sp>
-        <p:nvSpPr>
-          <p:cNvPr id="4" name="Slide Number Placeholder 3"/>
-          <p:cNvSpPr>
-            <a:spLocks noGrp="1"/>
-          </p:cNvSpPr>
-          <p:nvPr>
-            <p:ph type="sldNum" sz="quarter" idx="10"/>
-          </p:nvPr>
-        </p:nvSpPr>
-        <p:spPr/>
-        <p:txBody>
-          <a:bodyPr/>
-          <a:lstStyle/>
-          <a:p>
-            <a:fld id="{F7021451-1387-4CA6-816F-3879F97B5CBC}" type="slidenum">
-              <a:rPr lang="en-US"/>
-              <a:t>9</a:t>
             </a:fld>
             <a:endParaRPr lang="en-US"/>
           </a:p>
@@ -2312,7 +2230,7 @@
         </p:blipFill>
         <p:spPr>
           <a:xfrm>
-            <a:off x="3117600" y="2840279"/>
+            <a:off x="3117600" y="3161367"/>
             <a:ext cx="7161403" cy="4715199"/>
           </a:xfrm>
           <a:prstGeom prst="rect">
@@ -2356,9 +2274,41 @@
                 <a:ea typeface="Source Sans Pro" pitchFamily="34" charset="-122"/>
                 <a:cs typeface="Source Sans Pro" pitchFamily="34" charset="-120"/>
               </a:rPr>
-              <a:t>At the heart of the IH3A framework lies the Client Layer, responsible for executing attacks and managing the intelligent agent's learning process. This layer incorporates cutting-edge reinforcement learning models, specifically policy-optimization techniques, to create a highly adaptive and efficient agent.</a:t>
-            </a:r>
-            <a:endParaRPr lang="en-US" sz="1400" dirty="0"/>
+              <a:t>This framework will provide the necessary tools to train any kind of agent based on reinforced learning models. The main idea is to provide a platform for training agents giving them the information they need from the environment. AI agents will be able to parametrize their attack until they are able to bypass any type of defense.</a:t>
+            </a:r>
+          </a:p>
+          <a:p>
+            <a:pPr marL="0" indent="0">
+              <a:lnSpc>
+                <a:spcPts val="2100"/>
+              </a:lnSpc>
+              <a:buNone/>
+            </a:pPr>
+            <a:endParaRPr lang="en-US" sz="1400" dirty="0">
+              <a:solidFill>
+                <a:srgbClr val="E2E6E9"/>
+              </a:solidFill>
+              <a:latin typeface="Source Sans Pro" pitchFamily="34" charset="0"/>
+              <a:ea typeface="Source Sans Pro" pitchFamily="34" charset="-122"/>
+            </a:endParaRPr>
+          </a:p>
+          <a:p>
+            <a:pPr marL="0" indent="0">
+              <a:lnSpc>
+                <a:spcPts val="2100"/>
+              </a:lnSpc>
+              <a:buNone/>
+            </a:pPr>
+            <a:r>
+              <a:rPr lang="en-US" sz="1400" dirty="0">
+                <a:solidFill>
+                  <a:srgbClr val="E2E6E9"/>
+                </a:solidFill>
+                <a:latin typeface="Source Sans Pro" pitchFamily="34" charset="0"/>
+                <a:ea typeface="Source Sans Pro" pitchFamily="34" charset="-122"/>
+              </a:rPr>
+              <a:t>We are going to build a PoC using password brute-force attacks to 2 different kinds of web targets while they are being defended by a WAF, an IDS and a HIDS.</a:t>
+            </a:r>
           </a:p>
         </p:txBody>
       </p:sp>
@@ -3377,41 +3327,10 @@
                 <a:ea typeface="Source Sans Pro" pitchFamily="34" charset="-122"/>
                 <a:cs typeface="Source Sans Pro" pitchFamily="34" charset="-120"/>
               </a:rPr>
-              <a:t>The Defensive Layer forms a critical component of the IH3A framework, encompassing a diverse array of security mechanisms designed to challenge and refine the intelligent agent's capabilities. This layer leverages industry-standard tools such as OSSEC, Suricata, and ModSecurity to create a robust and realistic defensive environment.</a:t>
-            </a:r>
-            <a:endParaRPr lang="en-US" sz="1700" dirty="0"/>
-          </a:p>
-        </p:txBody>
-      </p:sp>
-      <p:sp>
-        <p:nvSpPr>
-          <p:cNvPr id="4" name="Text 2"/>
-          <p:cNvSpPr/>
-          <p:nvPr/>
-        </p:nvSpPr>
-        <p:spPr>
-          <a:xfrm>
-            <a:off x="1185029" y="3173611"/>
-            <a:ext cx="12260223" cy="1332071"/>
-          </a:xfrm>
-          <a:prstGeom prst="rect">
-            <a:avLst/>
-          </a:prstGeom>
-          <a:noFill/>
-          <a:ln/>
-        </p:spPr>
-        <p:txBody>
-          <a:bodyPr wrap="square" lIns="0" tIns="0" rIns="0" bIns="0" rtlCol="0" anchor="t"/>
-          <a:lstStyle/>
-          <a:p>
-            <a:pPr marL="0" indent="0">
-              <a:lnSpc>
-                <a:spcPts val="2600"/>
-              </a:lnSpc>
-              <a:buNone/>
-            </a:pPr>
-            <a:r>
-              <a:rPr lang="en-US" sz="1700" dirty="0">
+              <a:t>The Defensive Layer is a key component of IH3A, utilizing a range of security tools to challenge and refine the intelligent agent's capabilities. In our PoC we include OSSEC, Suricata, and </a:t>
+            </a:r>
+            <a:r>
+              <a:rPr lang="en-US" sz="1700" dirty="0" err="1">
                 <a:solidFill>
                   <a:srgbClr val="E2E6E9"/>
                 </a:solidFill>
@@ -3419,7 +3338,18 @@
                 <a:ea typeface="Source Sans Pro" pitchFamily="34" charset="-122"/>
                 <a:cs typeface="Source Sans Pro" pitchFamily="34" charset="-120"/>
               </a:rPr>
-              <a:t>Each defensive tool is meticulously configured to send detailed notifications via SysLog or API consumption, providing rich feedback to the Agent Helper. This information is crucial for accurately assessing the agent's performance and guiding its learning process. The integration of multiple defensive technologies ensures that the agent is trained against a variety of detection and prevention strategies, mirroring real-world cybersecurity landscapes. Our implementation include the following defensive mechanisms:</a:t>
+              <a:t>ModSecurity</a:t>
+            </a:r>
+            <a:r>
+              <a:rPr lang="en-US" sz="1700" dirty="0">
+                <a:solidFill>
+                  <a:srgbClr val="E2E6E9"/>
+                </a:solidFill>
+                <a:latin typeface="Source Sans Pro" pitchFamily="34" charset="0"/>
+                <a:ea typeface="Source Sans Pro" pitchFamily="34" charset="-122"/>
+                <a:cs typeface="Source Sans Pro" pitchFamily="34" charset="-120"/>
+              </a:rPr>
+              <a:t>, create a realistic defensive environment.</a:t>
             </a:r>
             <a:endParaRPr lang="en-US" sz="1700" dirty="0"/>
           </a:p>
@@ -3427,13 +3357,77 @@
       </p:sp>
       <p:sp>
         <p:nvSpPr>
+          <p:cNvPr id="4" name="Text 2"/>
+          <p:cNvSpPr/>
+          <p:nvPr/>
+        </p:nvSpPr>
+        <p:spPr>
+          <a:xfrm>
+            <a:off x="1185029" y="2772052"/>
+            <a:ext cx="12260223" cy="1332071"/>
+          </a:xfrm>
+          <a:prstGeom prst="rect">
+            <a:avLst/>
+          </a:prstGeom>
+          <a:noFill/>
+          <a:ln/>
+        </p:spPr>
+        <p:txBody>
+          <a:bodyPr wrap="square" lIns="0" tIns="0" rIns="0" bIns="0" rtlCol="0" anchor="t"/>
+          <a:lstStyle/>
+          <a:p>
+            <a:pPr marL="0" indent="0">
+              <a:lnSpc>
+                <a:spcPts val="2600"/>
+              </a:lnSpc>
+              <a:buNone/>
+            </a:pPr>
+            <a:r>
+              <a:rPr lang="en-US" sz="1700" dirty="0">
+                <a:solidFill>
+                  <a:srgbClr val="E2E6E9"/>
+                </a:solidFill>
+                <a:latin typeface="Source Sans Pro" pitchFamily="34" charset="0"/>
+                <a:ea typeface="Source Sans Pro" pitchFamily="34" charset="-122"/>
+                <a:cs typeface="Source Sans Pro" pitchFamily="34" charset="-120"/>
+              </a:rPr>
+              <a:t>Each tool provides detailed notifications via </a:t>
+            </a:r>
+            <a:r>
+              <a:rPr lang="en-US" sz="1700" dirty="0" err="1">
+                <a:solidFill>
+                  <a:srgbClr val="E2E6E9"/>
+                </a:solidFill>
+                <a:latin typeface="Source Sans Pro" pitchFamily="34" charset="0"/>
+                <a:ea typeface="Source Sans Pro" pitchFamily="34" charset="-122"/>
+                <a:cs typeface="Source Sans Pro" pitchFamily="34" charset="-120"/>
+              </a:rPr>
+              <a:t>SysLog</a:t>
+            </a:r>
+            <a:r>
+              <a:rPr lang="en-US" sz="1700" dirty="0">
+                <a:solidFill>
+                  <a:srgbClr val="E2E6E9"/>
+                </a:solidFill>
+                <a:latin typeface="Source Sans Pro" pitchFamily="34" charset="0"/>
+                <a:ea typeface="Source Sans Pro" pitchFamily="34" charset="-122"/>
+                <a:cs typeface="Source Sans Pro" pitchFamily="34" charset="-120"/>
+              </a:rPr>
+              <a:t> or API, offering valuable feedback to the Agent Helper for performance assessment and learning. This integration of multiple defense technologies ensures the agent is trained against various detection and prevention strategies, mimicking real-world cybersecurity scenarios.</a:t>
+            </a:r>
+            <a:endParaRPr lang="en-US" sz="1700" dirty="0"/>
+          </a:p>
+        </p:txBody>
+      </p:sp>
+      <p:sp>
+        <p:nvSpPr>
           <p:cNvPr id="5" name="Text 3"/>
           <p:cNvSpPr/>
           <p:nvPr/>
         </p:nvSpPr>
         <p:spPr>
           <a:xfrm>
-            <a:off x="1185029" y="4977408"/>
+            <a:off x="1185029" y="5577699"/>
             <a:ext cx="2523173" cy="315278"/>
           </a:xfrm>
           <a:prstGeom prst="rect">
@@ -3475,7 +3469,7 @@
         </p:nvSpPr>
         <p:spPr>
           <a:xfrm>
-            <a:off x="1185029" y="5514618"/>
+            <a:off x="1185029" y="6114909"/>
             <a:ext cx="3725108" cy="1332071"/>
           </a:xfrm>
           <a:prstGeom prst="rect">
@@ -3517,7 +3511,7 @@
         </p:nvSpPr>
         <p:spPr>
           <a:xfrm>
-            <a:off x="5459492" y="4977408"/>
+            <a:off x="5459492" y="5577699"/>
             <a:ext cx="2523173" cy="315278"/>
           </a:xfrm>
           <a:prstGeom prst="rect">
@@ -3559,7 +3553,7 @@
         </p:nvSpPr>
         <p:spPr>
           <a:xfrm>
-            <a:off x="5459492" y="5514618"/>
+            <a:off x="5459492" y="6114909"/>
             <a:ext cx="3725108" cy="1665089"/>
           </a:xfrm>
           <a:prstGeom prst="rect">
@@ -3601,7 +3595,7 @@
         </p:nvSpPr>
         <p:spPr>
           <a:xfrm>
-            <a:off x="9733955" y="4977408"/>
+            <a:off x="9733955" y="5577699"/>
             <a:ext cx="2523173" cy="315278"/>
           </a:xfrm>
           <a:prstGeom prst="rect">
@@ -3643,7 +3637,7 @@
         </p:nvSpPr>
         <p:spPr>
           <a:xfrm>
-            <a:off x="9733955" y="5514618"/>
+            <a:off x="9733955" y="6114909"/>
             <a:ext cx="3725108" cy="1332071"/>
           </a:xfrm>
           <a:prstGeom prst="rect">
@@ -3677,6 +3671,96 @@
           </a:p>
         </p:txBody>
       </p:sp>
+      <p:pic>
+        <p:nvPicPr>
+          <p:cNvPr id="12" name="Picture 11" descr="A group of meerkats standing on a hill with a sun behind them&#10;&#10;Description automatically generated">
+            <a:extLst>
+              <a:ext uri="{FF2B5EF4-FFF2-40B4-BE49-F238E27FC236}">
+                <a16:creationId xmlns:a16="http://schemas.microsoft.com/office/drawing/2014/main" id="{D9393546-04A9-8040-0F56-01DF01C17E04}"/>
+              </a:ext>
+            </a:extLst>
+          </p:cNvPr>
+          <p:cNvPicPr>
+            <a:picLocks noChangeAspect="1"/>
+          </p:cNvPicPr>
+          <p:nvPr/>
+        </p:nvPicPr>
+        <p:blipFill>
+          <a:blip r:embed="rId3"/>
+          <a:stretch>
+            <a:fillRect/>
+          </a:stretch>
+        </p:blipFill>
+        <p:spPr>
+          <a:xfrm>
+            <a:off x="5878210" y="3788845"/>
+            <a:ext cx="2303907" cy="1677888"/>
+          </a:xfrm>
+          <a:prstGeom prst="rect">
+            <a:avLst/>
+          </a:prstGeom>
+        </p:spPr>
+      </p:pic>
+      <p:pic>
+        <p:nvPicPr>
+          <p:cNvPr id="16" name="Picture 15" descr="A logo with text on it&#10;&#10;Description automatically generated">
+            <a:extLst>
+              <a:ext uri="{FF2B5EF4-FFF2-40B4-BE49-F238E27FC236}">
+                <a16:creationId xmlns:a16="http://schemas.microsoft.com/office/drawing/2014/main" id="{742D0FEE-62C8-E198-6B82-B491C46958B0}"/>
+              </a:ext>
+            </a:extLst>
+          </p:cNvPr>
+          <p:cNvPicPr>
+            <a:picLocks noChangeAspect="1"/>
+          </p:cNvPicPr>
+          <p:nvPr/>
+        </p:nvPicPr>
+        <p:blipFill>
+          <a:blip r:embed="rId4"/>
+          <a:stretch>
+            <a:fillRect/>
+          </a:stretch>
+        </p:blipFill>
+        <p:spPr>
+          <a:xfrm>
+            <a:off x="9733954" y="3896231"/>
+            <a:ext cx="2685895" cy="1348193"/>
+          </a:xfrm>
+          <a:prstGeom prst="rect">
+            <a:avLst/>
+          </a:prstGeom>
+        </p:spPr>
+      </p:pic>
+      <p:pic>
+        <p:nvPicPr>
+          <p:cNvPr id="20" name="Picture 19" descr="A logo of a tornado&#10;&#10;Description automatically generated">
+            <a:extLst>
+              <a:ext uri="{FF2B5EF4-FFF2-40B4-BE49-F238E27FC236}">
+                <a16:creationId xmlns:a16="http://schemas.microsoft.com/office/drawing/2014/main" id="{20E153CF-7926-7995-4C15-C57A3C522648}"/>
+              </a:ext>
+            </a:extLst>
+          </p:cNvPr>
+          <p:cNvPicPr>
+            <a:picLocks noChangeAspect="1"/>
+          </p:cNvPicPr>
+          <p:nvPr/>
+        </p:nvPicPr>
+        <p:blipFill>
+          <a:blip r:embed="rId5"/>
+          <a:stretch>
+            <a:fillRect/>
+          </a:stretch>
+        </p:blipFill>
+        <p:spPr>
+          <a:xfrm>
+            <a:off x="1267341" y="3349896"/>
+            <a:ext cx="2440861" cy="2440861"/>
+          </a:xfrm>
+          <a:prstGeom prst="rect">
+            <a:avLst/>
+          </a:prstGeom>
+        </p:spPr>
+      </p:pic>
     </p:spTree>
   </p:cSld>
   <p:clrMapOvr>
@@ -3828,6 +3912,815 @@
           </a:p>
         </p:txBody>
       </p:sp>
+      <p:sp>
+        <p:nvSpPr>
+          <p:cNvPr id="5" name="Shape 3"/>
+          <p:cNvSpPr/>
+          <p:nvPr/>
+        </p:nvSpPr>
+        <p:spPr>
+          <a:xfrm>
+            <a:off x="1185029" y="4669869"/>
+            <a:ext cx="12260223" cy="2977515"/>
+          </a:xfrm>
+          <a:prstGeom prst="roundRect">
+            <a:avLst>
+              <a:gd name="adj" fmla="val 1077"/>
+            </a:avLst>
+          </a:prstGeom>
+          <a:noFill/>
+          <a:ln w="7620">
+            <a:solidFill>
+              <a:srgbClr val="FFFFFF">
+                <a:alpha val="24000"/>
+              </a:srgbClr>
+            </a:solidFill>
+            <a:prstDash val="solid"/>
+          </a:ln>
+        </p:spPr>
+        <p:txBody>
+          <a:bodyPr/>
+          <a:lstStyle/>
+          <a:p>
+            <a:endParaRPr lang="es-MX"/>
+          </a:p>
+        </p:txBody>
+      </p:sp>
+      <p:sp>
+        <p:nvSpPr>
+          <p:cNvPr id="6" name="Shape 4"/>
+          <p:cNvSpPr/>
+          <p:nvPr/>
+        </p:nvSpPr>
+        <p:spPr>
+          <a:xfrm>
+            <a:off x="1192649" y="4677489"/>
+            <a:ext cx="12243673" cy="592455"/>
+          </a:xfrm>
+          <a:prstGeom prst="rect">
+            <a:avLst/>
+          </a:prstGeom>
+          <a:solidFill>
+            <a:srgbClr val="FFFFFF">
+              <a:alpha val="4000"/>
+            </a:srgbClr>
+          </a:solidFill>
+          <a:ln/>
+        </p:spPr>
+        <p:txBody>
+          <a:bodyPr/>
+          <a:lstStyle/>
+          <a:p>
+            <a:endParaRPr lang="es-MX" b="1" dirty="0"/>
+          </a:p>
+        </p:txBody>
+      </p:sp>
+      <p:sp>
+        <p:nvSpPr>
+          <p:cNvPr id="7" name="Text 5"/>
+          <p:cNvSpPr/>
+          <p:nvPr/>
+        </p:nvSpPr>
+        <p:spPr>
+          <a:xfrm>
+            <a:off x="1407795" y="4813340"/>
+            <a:ext cx="3649504" cy="320754"/>
+          </a:xfrm>
+          <a:prstGeom prst="rect">
+            <a:avLst/>
+          </a:prstGeom>
+          <a:noFill/>
+          <a:ln/>
+        </p:spPr>
+        <p:txBody>
+          <a:bodyPr wrap="none" lIns="0" tIns="0" rIns="0" bIns="0" rtlCol="0" anchor="t"/>
+          <a:lstStyle/>
+          <a:p>
+            <a:pPr marL="0" indent="0">
+              <a:lnSpc>
+                <a:spcPts val="2500"/>
+              </a:lnSpc>
+              <a:buNone/>
+            </a:pPr>
+            <a:r>
+              <a:rPr lang="en-US" sz="1650" b="1" dirty="0">
+                <a:solidFill>
+                  <a:srgbClr val="E2E6E9"/>
+                </a:solidFill>
+                <a:latin typeface="Source Sans Pro" pitchFamily="34" charset="0"/>
+                <a:ea typeface="Source Sans Pro" pitchFamily="34" charset="-122"/>
+                <a:cs typeface="Source Sans Pro" pitchFamily="34" charset="-120"/>
+              </a:rPr>
+              <a:t>Target</a:t>
+            </a:r>
+            <a:endParaRPr lang="en-US" sz="1650" b="1" dirty="0"/>
+          </a:p>
+        </p:txBody>
+      </p:sp>
+      <p:sp>
+        <p:nvSpPr>
+          <p:cNvPr id="8" name="Text 6"/>
+          <p:cNvSpPr/>
+          <p:nvPr/>
+        </p:nvSpPr>
+        <p:spPr>
+          <a:xfrm>
+            <a:off x="5492353" y="4813340"/>
+            <a:ext cx="3645694" cy="320754"/>
+          </a:xfrm>
+          <a:prstGeom prst="rect">
+            <a:avLst/>
+          </a:prstGeom>
+          <a:noFill/>
+          <a:ln/>
+        </p:spPr>
+        <p:txBody>
+          <a:bodyPr wrap="none" lIns="0" tIns="0" rIns="0" bIns="0" rtlCol="0" anchor="t"/>
+          <a:lstStyle/>
+          <a:p>
+            <a:pPr marL="0" indent="0">
+              <a:lnSpc>
+                <a:spcPts val="2500"/>
+              </a:lnSpc>
+              <a:buNone/>
+            </a:pPr>
+            <a:r>
+              <a:rPr lang="en-US" sz="1650" b="1" dirty="0">
+                <a:solidFill>
+                  <a:srgbClr val="E2E6E9"/>
+                </a:solidFill>
+                <a:latin typeface="Source Sans Pro" pitchFamily="34" charset="0"/>
+                <a:ea typeface="Source Sans Pro" pitchFamily="34" charset="-122"/>
+                <a:cs typeface="Source Sans Pro" pitchFamily="34" charset="-120"/>
+              </a:rPr>
+              <a:t>WebApp1</a:t>
+            </a:r>
+            <a:endParaRPr lang="en-US" sz="1650" b="1" dirty="0"/>
+          </a:p>
+        </p:txBody>
+      </p:sp>
+      <p:sp>
+        <p:nvSpPr>
+          <p:cNvPr id="9" name="Text 7"/>
+          <p:cNvSpPr/>
+          <p:nvPr/>
+        </p:nvSpPr>
+        <p:spPr>
+          <a:xfrm>
+            <a:off x="9573101" y="4813340"/>
+            <a:ext cx="3649504" cy="320754"/>
+          </a:xfrm>
+          <a:prstGeom prst="rect">
+            <a:avLst/>
+          </a:prstGeom>
+          <a:noFill/>
+          <a:ln/>
+        </p:spPr>
+        <p:txBody>
+          <a:bodyPr wrap="none" lIns="0" tIns="0" rIns="0" bIns="0" rtlCol="0" anchor="t"/>
+          <a:lstStyle/>
+          <a:p>
+            <a:pPr marL="0" indent="0">
+              <a:lnSpc>
+                <a:spcPts val="2500"/>
+              </a:lnSpc>
+              <a:buNone/>
+            </a:pPr>
+            <a:r>
+              <a:rPr lang="en-US" sz="1650" b="1" dirty="0">
+                <a:solidFill>
+                  <a:srgbClr val="E2E6E9"/>
+                </a:solidFill>
+                <a:latin typeface="Source Sans Pro" pitchFamily="34" charset="0"/>
+                <a:ea typeface="Source Sans Pro" pitchFamily="34" charset="-122"/>
+                <a:cs typeface="Source Sans Pro" pitchFamily="34" charset="-120"/>
+              </a:rPr>
+              <a:t>WebApp2</a:t>
+            </a:r>
+            <a:endParaRPr lang="en-US" sz="1650" b="1" dirty="0"/>
+          </a:p>
+        </p:txBody>
+      </p:sp>
+      <p:sp>
+        <p:nvSpPr>
+          <p:cNvPr id="10" name="Shape 8"/>
+          <p:cNvSpPr/>
+          <p:nvPr/>
+        </p:nvSpPr>
+        <p:spPr>
+          <a:xfrm>
+            <a:off x="1192649" y="5269944"/>
+            <a:ext cx="12243673" cy="592455"/>
+          </a:xfrm>
+          <a:prstGeom prst="rect">
+            <a:avLst/>
+          </a:prstGeom>
+          <a:solidFill>
+            <a:srgbClr val="000000">
+              <a:alpha val="4000"/>
+            </a:srgbClr>
+          </a:solidFill>
+          <a:ln/>
+        </p:spPr>
+        <p:txBody>
+          <a:bodyPr/>
+          <a:lstStyle/>
+          <a:p>
+            <a:endParaRPr lang="es-MX"/>
+          </a:p>
+        </p:txBody>
+      </p:sp>
+      <p:sp>
+        <p:nvSpPr>
+          <p:cNvPr id="11" name="Text 9"/>
+          <p:cNvSpPr/>
+          <p:nvPr/>
+        </p:nvSpPr>
+        <p:spPr>
+          <a:xfrm>
+            <a:off x="1407795" y="5405795"/>
+            <a:ext cx="3649504" cy="320754"/>
+          </a:xfrm>
+          <a:prstGeom prst="rect">
+            <a:avLst/>
+          </a:prstGeom>
+          <a:noFill/>
+          <a:ln/>
+        </p:spPr>
+        <p:txBody>
+          <a:bodyPr wrap="none" lIns="0" tIns="0" rIns="0" bIns="0" rtlCol="0" anchor="t"/>
+          <a:lstStyle/>
+          <a:p>
+            <a:pPr marL="0" indent="0">
+              <a:lnSpc>
+                <a:spcPts val="2500"/>
+              </a:lnSpc>
+              <a:buNone/>
+            </a:pPr>
+            <a:r>
+              <a:rPr lang="en-US" sz="1650" dirty="0">
+                <a:solidFill>
+                  <a:srgbClr val="E2E6E9"/>
+                </a:solidFill>
+                <a:latin typeface="Source Sans Pro" pitchFamily="34" charset="0"/>
+                <a:ea typeface="Source Sans Pro" pitchFamily="34" charset="-122"/>
+                <a:cs typeface="Source Sans Pro" pitchFamily="34" charset="-120"/>
+              </a:rPr>
+              <a:t>Authentication Method</a:t>
+            </a:r>
+            <a:endParaRPr lang="en-US" sz="1650" dirty="0"/>
+          </a:p>
+        </p:txBody>
+      </p:sp>
+      <p:sp>
+        <p:nvSpPr>
+          <p:cNvPr id="12" name="Text 10"/>
+          <p:cNvSpPr/>
+          <p:nvPr/>
+        </p:nvSpPr>
+        <p:spPr>
+          <a:xfrm>
+            <a:off x="5492353" y="5405795"/>
+            <a:ext cx="3645694" cy="320754"/>
+          </a:xfrm>
+          <a:prstGeom prst="rect">
+            <a:avLst/>
+          </a:prstGeom>
+          <a:noFill/>
+          <a:ln/>
+        </p:spPr>
+        <p:txBody>
+          <a:bodyPr wrap="none" lIns="0" tIns="0" rIns="0" bIns="0" rtlCol="0" anchor="t"/>
+          <a:lstStyle/>
+          <a:p>
+            <a:pPr marL="0" indent="0">
+              <a:lnSpc>
+                <a:spcPts val="2500"/>
+              </a:lnSpc>
+              <a:buNone/>
+            </a:pPr>
+            <a:r>
+              <a:rPr lang="en-US" sz="1650" dirty="0">
+                <a:solidFill>
+                  <a:srgbClr val="E2E6E9"/>
+                </a:solidFill>
+                <a:latin typeface="Source Sans Pro" pitchFamily="34" charset="0"/>
+                <a:ea typeface="Source Sans Pro" pitchFamily="34" charset="-122"/>
+                <a:cs typeface="Source Sans Pro" pitchFamily="34" charset="-120"/>
+              </a:rPr>
+              <a:t>Form Login with Cookies</a:t>
+            </a:r>
+            <a:endParaRPr lang="en-US" sz="1650" dirty="0"/>
+          </a:p>
+        </p:txBody>
+      </p:sp>
+      <p:sp>
+        <p:nvSpPr>
+          <p:cNvPr id="13" name="Text 11"/>
+          <p:cNvSpPr/>
+          <p:nvPr/>
+        </p:nvSpPr>
+        <p:spPr>
+          <a:xfrm>
+            <a:off x="9573101" y="5405795"/>
+            <a:ext cx="3649504" cy="320754"/>
+          </a:xfrm>
+          <a:prstGeom prst="rect">
+            <a:avLst/>
+          </a:prstGeom>
+          <a:noFill/>
+          <a:ln/>
+        </p:spPr>
+        <p:txBody>
+          <a:bodyPr wrap="none" lIns="0" tIns="0" rIns="0" bIns="0" rtlCol="0" anchor="t"/>
+          <a:lstStyle/>
+          <a:p>
+            <a:pPr marL="0" indent="0">
+              <a:lnSpc>
+                <a:spcPts val="2500"/>
+              </a:lnSpc>
+              <a:buNone/>
+            </a:pPr>
+            <a:r>
+              <a:rPr lang="en-US" sz="1650" dirty="0">
+                <a:solidFill>
+                  <a:srgbClr val="E2E6E9"/>
+                </a:solidFill>
+                <a:latin typeface="Source Sans Pro" pitchFamily="34" charset="0"/>
+                <a:ea typeface="Source Sans Pro" pitchFamily="34" charset="-122"/>
+                <a:cs typeface="Source Sans Pro" pitchFamily="34" charset="-120"/>
+              </a:rPr>
+              <a:t>REST API with JWT</a:t>
+            </a:r>
+            <a:endParaRPr lang="en-US" sz="1650" dirty="0"/>
+          </a:p>
+        </p:txBody>
+      </p:sp>
+      <p:sp>
+        <p:nvSpPr>
+          <p:cNvPr id="14" name="Shape 12"/>
+          <p:cNvSpPr/>
+          <p:nvPr/>
+        </p:nvSpPr>
+        <p:spPr>
+          <a:xfrm>
+            <a:off x="1192649" y="5862399"/>
+            <a:ext cx="12243673" cy="592455"/>
+          </a:xfrm>
+          <a:prstGeom prst="rect">
+            <a:avLst/>
+          </a:prstGeom>
+          <a:solidFill>
+            <a:srgbClr val="FFFFFF">
+              <a:alpha val="4000"/>
+            </a:srgbClr>
+          </a:solidFill>
+          <a:ln/>
+        </p:spPr>
+        <p:txBody>
+          <a:bodyPr/>
+          <a:lstStyle/>
+          <a:p>
+            <a:endParaRPr lang="es-MX"/>
+          </a:p>
+        </p:txBody>
+      </p:sp>
+      <p:sp>
+        <p:nvSpPr>
+          <p:cNvPr id="15" name="Text 13"/>
+          <p:cNvSpPr/>
+          <p:nvPr/>
+        </p:nvSpPr>
+        <p:spPr>
+          <a:xfrm>
+            <a:off x="1407795" y="5998250"/>
+            <a:ext cx="3649504" cy="320754"/>
+          </a:xfrm>
+          <a:prstGeom prst="rect">
+            <a:avLst/>
+          </a:prstGeom>
+          <a:noFill/>
+          <a:ln/>
+        </p:spPr>
+        <p:txBody>
+          <a:bodyPr wrap="none" lIns="0" tIns="0" rIns="0" bIns="0" rtlCol="0" anchor="t"/>
+          <a:lstStyle/>
+          <a:p>
+            <a:pPr marL="0" indent="0">
+              <a:lnSpc>
+                <a:spcPts val="2500"/>
+              </a:lnSpc>
+              <a:buNone/>
+            </a:pPr>
+            <a:r>
+              <a:rPr lang="en-US" sz="1650" dirty="0">
+                <a:solidFill>
+                  <a:srgbClr val="E2E6E9"/>
+                </a:solidFill>
+                <a:latin typeface="Source Sans Pro" pitchFamily="34" charset="0"/>
+                <a:ea typeface="Source Sans Pro" pitchFamily="34" charset="-122"/>
+                <a:cs typeface="Source Sans Pro" pitchFamily="34" charset="-120"/>
+              </a:rPr>
+              <a:t>Session Management</a:t>
+            </a:r>
+            <a:endParaRPr lang="en-US" sz="1650" dirty="0"/>
+          </a:p>
+        </p:txBody>
+      </p:sp>
+      <p:sp>
+        <p:nvSpPr>
+          <p:cNvPr id="16" name="Text 14"/>
+          <p:cNvSpPr/>
+          <p:nvPr/>
+        </p:nvSpPr>
+        <p:spPr>
+          <a:xfrm>
+            <a:off x="5492353" y="5998250"/>
+            <a:ext cx="3645694" cy="320754"/>
+          </a:xfrm>
+          <a:prstGeom prst="rect">
+            <a:avLst/>
+          </a:prstGeom>
+          <a:noFill/>
+          <a:ln/>
+        </p:spPr>
+        <p:txBody>
+          <a:bodyPr wrap="none" lIns="0" tIns="0" rIns="0" bIns="0" rtlCol="0" anchor="t"/>
+          <a:lstStyle/>
+          <a:p>
+            <a:pPr marL="0" indent="0">
+              <a:lnSpc>
+                <a:spcPts val="2500"/>
+              </a:lnSpc>
+              <a:buNone/>
+            </a:pPr>
+            <a:r>
+              <a:rPr lang="en-US" sz="1650" dirty="0">
+                <a:solidFill>
+                  <a:srgbClr val="E2E6E9"/>
+                </a:solidFill>
+                <a:latin typeface="Source Sans Pro" pitchFamily="34" charset="0"/>
+                <a:ea typeface="Source Sans Pro" pitchFamily="34" charset="-122"/>
+                <a:cs typeface="Source Sans Pro" pitchFamily="34" charset="-120"/>
+              </a:rPr>
+              <a:t>Cookie-based</a:t>
+            </a:r>
+            <a:endParaRPr lang="en-US" sz="1650" dirty="0"/>
+          </a:p>
+        </p:txBody>
+      </p:sp>
+      <p:sp>
+        <p:nvSpPr>
+          <p:cNvPr id="17" name="Text 15"/>
+          <p:cNvSpPr/>
+          <p:nvPr/>
+        </p:nvSpPr>
+        <p:spPr>
+          <a:xfrm>
+            <a:off x="9573101" y="5998250"/>
+            <a:ext cx="3649504" cy="320754"/>
+          </a:xfrm>
+          <a:prstGeom prst="rect">
+            <a:avLst/>
+          </a:prstGeom>
+          <a:noFill/>
+          <a:ln/>
+        </p:spPr>
+        <p:txBody>
+          <a:bodyPr wrap="none" lIns="0" tIns="0" rIns="0" bIns="0" rtlCol="0" anchor="t"/>
+          <a:lstStyle/>
+          <a:p>
+            <a:pPr marL="0" indent="0">
+              <a:lnSpc>
+                <a:spcPts val="2500"/>
+              </a:lnSpc>
+              <a:buNone/>
+            </a:pPr>
+            <a:r>
+              <a:rPr lang="en-US" sz="1650" dirty="0">
+                <a:solidFill>
+                  <a:srgbClr val="E2E6E9"/>
+                </a:solidFill>
+                <a:latin typeface="Source Sans Pro" pitchFamily="34" charset="0"/>
+                <a:ea typeface="Source Sans Pro" pitchFamily="34" charset="-122"/>
+                <a:cs typeface="Source Sans Pro" pitchFamily="34" charset="-120"/>
+              </a:rPr>
+              <a:t>Token-based</a:t>
+            </a:r>
+            <a:endParaRPr lang="en-US" sz="1650" dirty="0"/>
+          </a:p>
+        </p:txBody>
+      </p:sp>
+      <p:sp>
+        <p:nvSpPr>
+          <p:cNvPr id="18" name="Shape 16"/>
+          <p:cNvSpPr/>
+          <p:nvPr/>
+        </p:nvSpPr>
+        <p:spPr>
+          <a:xfrm>
+            <a:off x="1192649" y="6454854"/>
+            <a:ext cx="12243673" cy="592455"/>
+          </a:xfrm>
+          <a:prstGeom prst="rect">
+            <a:avLst/>
+          </a:prstGeom>
+          <a:solidFill>
+            <a:srgbClr val="000000">
+              <a:alpha val="4000"/>
+            </a:srgbClr>
+          </a:solidFill>
+          <a:ln/>
+        </p:spPr>
+        <p:txBody>
+          <a:bodyPr/>
+          <a:lstStyle/>
+          <a:p>
+            <a:endParaRPr lang="es-MX"/>
+          </a:p>
+        </p:txBody>
+      </p:sp>
+      <p:sp>
+        <p:nvSpPr>
+          <p:cNvPr id="19" name="Text 17"/>
+          <p:cNvSpPr/>
+          <p:nvPr/>
+        </p:nvSpPr>
+        <p:spPr>
+          <a:xfrm>
+            <a:off x="1407795" y="6590705"/>
+            <a:ext cx="3649504" cy="320754"/>
+          </a:xfrm>
+          <a:prstGeom prst="rect">
+            <a:avLst/>
+          </a:prstGeom>
+          <a:noFill/>
+          <a:ln/>
+        </p:spPr>
+        <p:txBody>
+          <a:bodyPr wrap="none" lIns="0" tIns="0" rIns="0" bIns="0" rtlCol="0" anchor="t"/>
+          <a:lstStyle/>
+          <a:p>
+            <a:pPr marL="0" indent="0">
+              <a:lnSpc>
+                <a:spcPts val="2500"/>
+              </a:lnSpc>
+              <a:buNone/>
+            </a:pPr>
+            <a:r>
+              <a:rPr lang="en-US" sz="1650" dirty="0">
+                <a:solidFill>
+                  <a:srgbClr val="E2E6E9"/>
+                </a:solidFill>
+                <a:latin typeface="Source Sans Pro" pitchFamily="34" charset="0"/>
+                <a:ea typeface="Source Sans Pro" pitchFamily="34" charset="-122"/>
+                <a:cs typeface="Source Sans Pro" pitchFamily="34" charset="-120"/>
+              </a:rPr>
+              <a:t>Additional Security</a:t>
+            </a:r>
+            <a:endParaRPr lang="en-US" sz="1650" dirty="0"/>
+          </a:p>
+        </p:txBody>
+      </p:sp>
+      <p:sp>
+        <p:nvSpPr>
+          <p:cNvPr id="20" name="Text 18"/>
+          <p:cNvSpPr/>
+          <p:nvPr/>
+        </p:nvSpPr>
+        <p:spPr>
+          <a:xfrm>
+            <a:off x="5492353" y="6590705"/>
+            <a:ext cx="3645694" cy="320754"/>
+          </a:xfrm>
+          <a:prstGeom prst="rect">
+            <a:avLst/>
+          </a:prstGeom>
+          <a:noFill/>
+          <a:ln/>
+        </p:spPr>
+        <p:txBody>
+          <a:bodyPr wrap="none" lIns="0" tIns="0" rIns="0" bIns="0" rtlCol="0" anchor="t"/>
+          <a:lstStyle/>
+          <a:p>
+            <a:pPr marL="0" indent="0">
+              <a:lnSpc>
+                <a:spcPts val="2500"/>
+              </a:lnSpc>
+              <a:buNone/>
+            </a:pPr>
+            <a:r>
+              <a:rPr lang="en-US" sz="1650" dirty="0">
+                <a:solidFill>
+                  <a:srgbClr val="E2E6E9"/>
+                </a:solidFill>
+                <a:latin typeface="Source Sans Pro" pitchFamily="34" charset="0"/>
+                <a:ea typeface="Source Sans Pro" pitchFamily="34" charset="-122"/>
+                <a:cs typeface="Source Sans Pro" pitchFamily="34" charset="-120"/>
+              </a:rPr>
+              <a:t>None</a:t>
+            </a:r>
+            <a:endParaRPr lang="en-US" sz="1650" dirty="0"/>
+          </a:p>
+        </p:txBody>
+      </p:sp>
+      <p:sp>
+        <p:nvSpPr>
+          <p:cNvPr id="21" name="Text 19"/>
+          <p:cNvSpPr/>
+          <p:nvPr/>
+        </p:nvSpPr>
+        <p:spPr>
+          <a:xfrm>
+            <a:off x="9573101" y="6590705"/>
+            <a:ext cx="3649504" cy="320754"/>
+          </a:xfrm>
+          <a:prstGeom prst="rect">
+            <a:avLst/>
+          </a:prstGeom>
+          <a:noFill/>
+          <a:ln/>
+        </p:spPr>
+        <p:txBody>
+          <a:bodyPr wrap="none" lIns="0" tIns="0" rIns="0" bIns="0" rtlCol="0" anchor="t"/>
+          <a:lstStyle/>
+          <a:p>
+            <a:pPr marL="0" indent="0">
+              <a:lnSpc>
+                <a:spcPts val="2500"/>
+              </a:lnSpc>
+              <a:buNone/>
+            </a:pPr>
+            <a:r>
+              <a:rPr lang="en-US" sz="1650" dirty="0">
+                <a:solidFill>
+                  <a:srgbClr val="E2E6E9"/>
+                </a:solidFill>
+                <a:latin typeface="Source Sans Pro" pitchFamily="34" charset="0"/>
+                <a:ea typeface="Source Sans Pro" pitchFamily="34" charset="-122"/>
+                <a:cs typeface="Source Sans Pro" pitchFamily="34" charset="-120"/>
+              </a:rPr>
+              <a:t>5-attempt lockout</a:t>
+            </a:r>
+            <a:endParaRPr lang="en-US" sz="1650" dirty="0"/>
+          </a:p>
+        </p:txBody>
+      </p:sp>
+      <p:sp>
+        <p:nvSpPr>
+          <p:cNvPr id="22" name="Shape 20"/>
+          <p:cNvSpPr/>
+          <p:nvPr/>
+        </p:nvSpPr>
+        <p:spPr>
+          <a:xfrm>
+            <a:off x="1192649" y="7047309"/>
+            <a:ext cx="12243673" cy="592455"/>
+          </a:xfrm>
+          <a:prstGeom prst="rect">
+            <a:avLst/>
+          </a:prstGeom>
+          <a:solidFill>
+            <a:srgbClr val="FFFFFF">
+              <a:alpha val="4000"/>
+            </a:srgbClr>
+          </a:solidFill>
+          <a:ln/>
+        </p:spPr>
+        <p:txBody>
+          <a:bodyPr/>
+          <a:lstStyle/>
+          <a:p>
+            <a:endParaRPr lang="es-MX"/>
+          </a:p>
+        </p:txBody>
+      </p:sp>
+      <p:sp>
+        <p:nvSpPr>
+          <p:cNvPr id="23" name="Text 21"/>
+          <p:cNvSpPr/>
+          <p:nvPr/>
+        </p:nvSpPr>
+        <p:spPr>
+          <a:xfrm>
+            <a:off x="1407795" y="7183160"/>
+            <a:ext cx="3649504" cy="320754"/>
+          </a:xfrm>
+          <a:prstGeom prst="rect">
+            <a:avLst/>
+          </a:prstGeom>
+          <a:noFill/>
+          <a:ln/>
+        </p:spPr>
+        <p:txBody>
+          <a:bodyPr wrap="none" lIns="0" tIns="0" rIns="0" bIns="0" rtlCol="0" anchor="t"/>
+          <a:lstStyle/>
+          <a:p>
+            <a:pPr marL="0" indent="0">
+              <a:lnSpc>
+                <a:spcPts val="2500"/>
+              </a:lnSpc>
+              <a:buNone/>
+            </a:pPr>
+            <a:r>
+              <a:rPr lang="en-US" sz="1650" dirty="0">
+                <a:solidFill>
+                  <a:srgbClr val="E2E6E9"/>
+                </a:solidFill>
+                <a:latin typeface="Source Sans Pro" pitchFamily="34" charset="0"/>
+                <a:ea typeface="Source Sans Pro" pitchFamily="34" charset="-122"/>
+                <a:cs typeface="Source Sans Pro" pitchFamily="34" charset="-120"/>
+              </a:rPr>
+              <a:t>API Structure</a:t>
+            </a:r>
+            <a:endParaRPr lang="en-US" sz="1650" dirty="0"/>
+          </a:p>
+        </p:txBody>
+      </p:sp>
+      <p:sp>
+        <p:nvSpPr>
+          <p:cNvPr id="24" name="Text 22"/>
+          <p:cNvSpPr/>
+          <p:nvPr/>
+        </p:nvSpPr>
+        <p:spPr>
+          <a:xfrm>
+            <a:off x="5492353" y="7183160"/>
+            <a:ext cx="3645694" cy="320754"/>
+          </a:xfrm>
+          <a:prstGeom prst="rect">
+            <a:avLst/>
+          </a:prstGeom>
+          <a:noFill/>
+          <a:ln/>
+        </p:spPr>
+        <p:txBody>
+          <a:bodyPr wrap="none" lIns="0" tIns="0" rIns="0" bIns="0" rtlCol="0" anchor="t"/>
+          <a:lstStyle/>
+          <a:p>
+            <a:pPr marL="0" indent="0">
+              <a:lnSpc>
+                <a:spcPts val="2500"/>
+              </a:lnSpc>
+              <a:buNone/>
+            </a:pPr>
+            <a:r>
+              <a:rPr lang="en-US" sz="1650" dirty="0">
+                <a:solidFill>
+                  <a:srgbClr val="E2E6E9"/>
+                </a:solidFill>
+                <a:latin typeface="Source Sans Pro" pitchFamily="34" charset="0"/>
+                <a:ea typeface="Source Sans Pro" pitchFamily="34" charset="-122"/>
+                <a:cs typeface="Source Sans Pro" pitchFamily="34" charset="-120"/>
+              </a:rPr>
+              <a:t>Traditional</a:t>
+            </a:r>
+            <a:endParaRPr lang="en-US" sz="1650" dirty="0"/>
+          </a:p>
+        </p:txBody>
+      </p:sp>
+      <p:sp>
+        <p:nvSpPr>
+          <p:cNvPr id="25" name="Text 23"/>
+          <p:cNvSpPr/>
+          <p:nvPr/>
+        </p:nvSpPr>
+        <p:spPr>
+          <a:xfrm>
+            <a:off x="9573101" y="7183160"/>
+            <a:ext cx="3649504" cy="320754"/>
+          </a:xfrm>
+          <a:prstGeom prst="rect">
+            <a:avLst/>
+          </a:prstGeom>
+          <a:noFill/>
+          <a:ln/>
+        </p:spPr>
+        <p:txBody>
+          <a:bodyPr wrap="none" lIns="0" tIns="0" rIns="0" bIns="0" rtlCol="0" anchor="t"/>
+          <a:lstStyle/>
+          <a:p>
+            <a:pPr marL="0" indent="0">
+              <a:lnSpc>
+                <a:spcPts val="2500"/>
+              </a:lnSpc>
+              <a:buNone/>
+            </a:pPr>
+            <a:r>
+              <a:rPr lang="en-US" sz="1650" dirty="0">
+                <a:solidFill>
+                  <a:srgbClr val="E2E6E9"/>
+                </a:solidFill>
+                <a:latin typeface="Source Sans Pro" pitchFamily="34" charset="0"/>
+                <a:ea typeface="Source Sans Pro" pitchFamily="34" charset="-122"/>
+                <a:cs typeface="Source Sans Pro" pitchFamily="34" charset="-120"/>
+              </a:rPr>
+              <a:t>RESTful</a:t>
+            </a:r>
+            <a:endParaRPr lang="en-US" sz="1650" dirty="0"/>
+          </a:p>
+        </p:txBody>
+      </p:sp>
     </p:spTree>
   </p:cSld>
   <p:clrMapOvr>
@@ -4946,7 +5839,7 @@
                 <a:ea typeface="Montserrat Bold" pitchFamily="34" charset="-122"/>
                 <a:cs typeface="Montserrat Bold" pitchFamily="34" charset="-120"/>
               </a:rPr>
-              <a:t>Syslog Metrics gathering</a:t>
+              <a:t>Syslog and API Metrics gathering</a:t>
             </a:r>
             <a:endParaRPr lang="en-US" sz="1850" dirty="0"/>
           </a:p>
@@ -5003,966 +5896,6 @@
 </file>
 
 <file path=ppt/slides/slide8.xml><?xml version="1.0" encoding="utf-8"?>
-<p:sld xmlns:a="http://schemas.openxmlformats.org/drawingml/2006/main" xmlns:r="http://schemas.openxmlformats.org/officeDocument/2006/relationships" xmlns:p="http://schemas.openxmlformats.org/presentationml/2006/main">
-  <p:cSld name="Slide 7">
-    <p:spTree>
-      <p:nvGrpSpPr>
-        <p:cNvPr id="1" name=""/>
-        <p:cNvGrpSpPr/>
-        <p:nvPr/>
-      </p:nvGrpSpPr>
-      <p:grpSpPr>
-        <a:xfrm>
-          <a:off x="0" y="0"/>
-          <a:ext cx="0" cy="0"/>
-          <a:chOff x="0" y="0"/>
-          <a:chExt cx="0" cy="0"/>
-        </a:xfrm>
-      </p:grpSpPr>
-      <p:sp>
-        <p:nvSpPr>
-          <p:cNvPr id="2" name="Text 0"/>
-          <p:cNvSpPr/>
-          <p:nvPr/>
-        </p:nvSpPr>
-        <p:spPr>
-          <a:xfrm>
-            <a:off x="1185029" y="587931"/>
-            <a:ext cx="8802291" cy="607338"/>
-          </a:xfrm>
-          <a:prstGeom prst="rect">
-            <a:avLst/>
-          </a:prstGeom>
-          <a:noFill/>
-          <a:ln/>
-        </p:spPr>
-        <p:txBody>
-          <a:bodyPr wrap="none" lIns="0" tIns="0" rIns="0" bIns="0" rtlCol="0" anchor="t"/>
-          <a:lstStyle/>
-          <a:p>
-            <a:pPr marL="0" indent="0">
-              <a:lnSpc>
-                <a:spcPts val="4750"/>
-              </a:lnSpc>
-              <a:buNone/>
-            </a:pPr>
-            <a:r>
-              <a:rPr lang="en-US" sz="3800" b="1" kern="0" spc="-38" dirty="0">
-                <a:solidFill>
-                  <a:srgbClr val="FFFFFF"/>
-                </a:solidFill>
-                <a:latin typeface="Montserrat Bold" pitchFamily="34" charset="0"/>
-                <a:ea typeface="Montserrat Bold" pitchFamily="34" charset="-122"/>
-                <a:cs typeface="Montserrat Bold" pitchFamily="34" charset="-120"/>
-              </a:rPr>
-              <a:t>WebApps: Diverse Testing Grounds</a:t>
-            </a:r>
-            <a:endParaRPr lang="en-US" sz="3800" dirty="0"/>
-          </a:p>
-        </p:txBody>
-      </p:sp>
-      <p:sp>
-        <p:nvSpPr>
-          <p:cNvPr id="3" name="Text 1"/>
-          <p:cNvSpPr/>
-          <p:nvPr/>
-        </p:nvSpPr>
-        <p:spPr>
-          <a:xfrm>
-            <a:off x="1185029" y="1622822"/>
-            <a:ext cx="12260223" cy="962263"/>
-          </a:xfrm>
-          <a:prstGeom prst="rect">
-            <a:avLst/>
-          </a:prstGeom>
-          <a:noFill/>
-          <a:ln/>
-        </p:spPr>
-        <p:txBody>
-          <a:bodyPr wrap="square" lIns="0" tIns="0" rIns="0" bIns="0" rtlCol="0" anchor="t"/>
-          <a:lstStyle/>
-          <a:p>
-            <a:pPr marL="0" indent="0">
-              <a:lnSpc>
-                <a:spcPts val="2500"/>
-              </a:lnSpc>
-              <a:buNone/>
-            </a:pPr>
-            <a:r>
-              <a:rPr lang="en-US" sz="1650" dirty="0">
-                <a:solidFill>
-                  <a:srgbClr val="E2E6E9"/>
-                </a:solidFill>
-                <a:latin typeface="Source Sans Pro" pitchFamily="34" charset="0"/>
-                <a:ea typeface="Source Sans Pro" pitchFamily="34" charset="-122"/>
-                <a:cs typeface="Source Sans Pro" pitchFamily="34" charset="-120"/>
-              </a:rPr>
-              <a:t>The WebApps component of our framework provides a rich, varied environment for testing and refining the IH3A agent's capabilities. Two distinct web applications have been developed, each presenting unique challenges and security configurations to ensure comprehensive training across different scenarios.</a:t>
-            </a:r>
-            <a:endParaRPr lang="en-US" sz="1650" dirty="0"/>
-          </a:p>
-        </p:txBody>
-      </p:sp>
-      <p:sp>
-        <p:nvSpPr>
-          <p:cNvPr id="4" name="Text 2"/>
-          <p:cNvSpPr/>
-          <p:nvPr/>
-        </p:nvSpPr>
-        <p:spPr>
-          <a:xfrm>
-            <a:off x="1185029" y="2825591"/>
-            <a:ext cx="12260223" cy="1603772"/>
-          </a:xfrm>
-          <a:prstGeom prst="rect">
-            <a:avLst/>
-          </a:prstGeom>
-          <a:noFill/>
-          <a:ln/>
-        </p:spPr>
-        <p:txBody>
-          <a:bodyPr wrap="square" lIns="0" tIns="0" rIns="0" bIns="0" rtlCol="0" anchor="t"/>
-          <a:lstStyle/>
-          <a:p>
-            <a:pPr marL="0" indent="0">
-              <a:lnSpc>
-                <a:spcPts val="2500"/>
-              </a:lnSpc>
-              <a:buNone/>
-            </a:pPr>
-            <a:r>
-              <a:rPr lang="en-US" sz="1650" dirty="0">
-                <a:solidFill>
-                  <a:srgbClr val="E2E6E9"/>
-                </a:solidFill>
-                <a:latin typeface="Source Sans Pro" pitchFamily="34" charset="0"/>
-                <a:ea typeface="Source Sans Pro" pitchFamily="34" charset="-122"/>
-                <a:cs typeface="Source Sans Pro" pitchFamily="34" charset="-120"/>
-              </a:rPr>
-              <a:t>WebApp1 represents a traditional web application using a basic Form login with cookie-based session management. This setup, while common, lacks advanced security features, providing an opportunity for the agent to learn fundamental attack strategies. In contrast, WebApp2 employs a more modern architecture, utilizing a REST API with JWT (JSON Web Tokens) for authentication. Additionally, it implements a temporary lockout mechanism after five failed login attempts, simulating real-world security practices and challenging the agent to develop more sophisticated evasion techniques.</a:t>
-            </a:r>
-            <a:endParaRPr lang="en-US" sz="1650" dirty="0"/>
-          </a:p>
-        </p:txBody>
-      </p:sp>
-      <p:sp>
-        <p:nvSpPr>
-          <p:cNvPr id="5" name="Shape 3"/>
-          <p:cNvSpPr/>
-          <p:nvPr/>
-        </p:nvSpPr>
-        <p:spPr>
-          <a:xfrm>
-            <a:off x="1185029" y="4669869"/>
-            <a:ext cx="12260223" cy="2977515"/>
-          </a:xfrm>
-          <a:prstGeom prst="roundRect">
-            <a:avLst>
-              <a:gd name="adj" fmla="val 1077"/>
-            </a:avLst>
-          </a:prstGeom>
-          <a:noFill/>
-          <a:ln w="7620">
-            <a:solidFill>
-              <a:srgbClr val="FFFFFF">
-                <a:alpha val="24000"/>
-              </a:srgbClr>
-            </a:solidFill>
-            <a:prstDash val="solid"/>
-          </a:ln>
-        </p:spPr>
-        <p:txBody>
-          <a:bodyPr/>
-          <a:lstStyle/>
-          <a:p>
-            <a:endParaRPr lang="es-MX"/>
-          </a:p>
-        </p:txBody>
-      </p:sp>
-      <p:sp>
-        <p:nvSpPr>
-          <p:cNvPr id="6" name="Shape 4"/>
-          <p:cNvSpPr/>
-          <p:nvPr/>
-        </p:nvSpPr>
-        <p:spPr>
-          <a:xfrm>
-            <a:off x="1192649" y="4677489"/>
-            <a:ext cx="12243673" cy="592455"/>
-          </a:xfrm>
-          <a:prstGeom prst="rect">
-            <a:avLst/>
-          </a:prstGeom>
-          <a:solidFill>
-            <a:srgbClr val="FFFFFF">
-              <a:alpha val="4000"/>
-            </a:srgbClr>
-          </a:solidFill>
-          <a:ln/>
-        </p:spPr>
-        <p:txBody>
-          <a:bodyPr/>
-          <a:lstStyle/>
-          <a:p>
-            <a:endParaRPr lang="es-MX"/>
-          </a:p>
-        </p:txBody>
-      </p:sp>
-      <p:sp>
-        <p:nvSpPr>
-          <p:cNvPr id="7" name="Text 5"/>
-          <p:cNvSpPr/>
-          <p:nvPr/>
-        </p:nvSpPr>
-        <p:spPr>
-          <a:xfrm>
-            <a:off x="1407795" y="4813340"/>
-            <a:ext cx="3649504" cy="320754"/>
-          </a:xfrm>
-          <a:prstGeom prst="rect">
-            <a:avLst/>
-          </a:prstGeom>
-          <a:noFill/>
-          <a:ln/>
-        </p:spPr>
-        <p:txBody>
-          <a:bodyPr wrap="none" lIns="0" tIns="0" rIns="0" bIns="0" rtlCol="0" anchor="t"/>
-          <a:lstStyle/>
-          <a:p>
-            <a:pPr marL="0" indent="0">
-              <a:lnSpc>
-                <a:spcPts val="2500"/>
-              </a:lnSpc>
-              <a:buNone/>
-            </a:pPr>
-            <a:r>
-              <a:rPr lang="en-US" sz="1650" dirty="0">
-                <a:solidFill>
-                  <a:srgbClr val="E2E6E9"/>
-                </a:solidFill>
-                <a:latin typeface="Source Sans Pro" pitchFamily="34" charset="0"/>
-                <a:ea typeface="Source Sans Pro" pitchFamily="34" charset="-122"/>
-                <a:cs typeface="Source Sans Pro" pitchFamily="34" charset="-120"/>
-              </a:rPr>
-              <a:t>Feature</a:t>
-            </a:r>
-            <a:endParaRPr lang="en-US" sz="1650" dirty="0"/>
-          </a:p>
-        </p:txBody>
-      </p:sp>
-      <p:sp>
-        <p:nvSpPr>
-          <p:cNvPr id="8" name="Text 6"/>
-          <p:cNvSpPr/>
-          <p:nvPr/>
-        </p:nvSpPr>
-        <p:spPr>
-          <a:xfrm>
-            <a:off x="5492353" y="4813340"/>
-            <a:ext cx="3645694" cy="320754"/>
-          </a:xfrm>
-          <a:prstGeom prst="rect">
-            <a:avLst/>
-          </a:prstGeom>
-          <a:noFill/>
-          <a:ln/>
-        </p:spPr>
-        <p:txBody>
-          <a:bodyPr wrap="none" lIns="0" tIns="0" rIns="0" bIns="0" rtlCol="0" anchor="t"/>
-          <a:lstStyle/>
-          <a:p>
-            <a:pPr marL="0" indent="0">
-              <a:lnSpc>
-                <a:spcPts val="2500"/>
-              </a:lnSpc>
-              <a:buNone/>
-            </a:pPr>
-            <a:r>
-              <a:rPr lang="en-US" sz="1650" dirty="0">
-                <a:solidFill>
-                  <a:srgbClr val="E2E6E9"/>
-                </a:solidFill>
-                <a:latin typeface="Source Sans Pro" pitchFamily="34" charset="0"/>
-                <a:ea typeface="Source Sans Pro" pitchFamily="34" charset="-122"/>
-                <a:cs typeface="Source Sans Pro" pitchFamily="34" charset="-120"/>
-              </a:rPr>
-              <a:t>WebApp1</a:t>
-            </a:r>
-            <a:endParaRPr lang="en-US" sz="1650" dirty="0"/>
-          </a:p>
-        </p:txBody>
-      </p:sp>
-      <p:sp>
-        <p:nvSpPr>
-          <p:cNvPr id="9" name="Text 7"/>
-          <p:cNvSpPr/>
-          <p:nvPr/>
-        </p:nvSpPr>
-        <p:spPr>
-          <a:xfrm>
-            <a:off x="9573101" y="4813340"/>
-            <a:ext cx="3649504" cy="320754"/>
-          </a:xfrm>
-          <a:prstGeom prst="rect">
-            <a:avLst/>
-          </a:prstGeom>
-          <a:noFill/>
-          <a:ln/>
-        </p:spPr>
-        <p:txBody>
-          <a:bodyPr wrap="none" lIns="0" tIns="0" rIns="0" bIns="0" rtlCol="0" anchor="t"/>
-          <a:lstStyle/>
-          <a:p>
-            <a:pPr marL="0" indent="0">
-              <a:lnSpc>
-                <a:spcPts val="2500"/>
-              </a:lnSpc>
-              <a:buNone/>
-            </a:pPr>
-            <a:r>
-              <a:rPr lang="en-US" sz="1650" dirty="0">
-                <a:solidFill>
-                  <a:srgbClr val="E2E6E9"/>
-                </a:solidFill>
-                <a:latin typeface="Source Sans Pro" pitchFamily="34" charset="0"/>
-                <a:ea typeface="Source Sans Pro" pitchFamily="34" charset="-122"/>
-                <a:cs typeface="Source Sans Pro" pitchFamily="34" charset="-120"/>
-              </a:rPr>
-              <a:t>WebApp2</a:t>
-            </a:r>
-            <a:endParaRPr lang="en-US" sz="1650" dirty="0"/>
-          </a:p>
-        </p:txBody>
-      </p:sp>
-      <p:sp>
-        <p:nvSpPr>
-          <p:cNvPr id="10" name="Shape 8"/>
-          <p:cNvSpPr/>
-          <p:nvPr/>
-        </p:nvSpPr>
-        <p:spPr>
-          <a:xfrm>
-            <a:off x="1192649" y="5269944"/>
-            <a:ext cx="12243673" cy="592455"/>
-          </a:xfrm>
-          <a:prstGeom prst="rect">
-            <a:avLst/>
-          </a:prstGeom>
-          <a:solidFill>
-            <a:srgbClr val="000000">
-              <a:alpha val="4000"/>
-            </a:srgbClr>
-          </a:solidFill>
-          <a:ln/>
-        </p:spPr>
-        <p:txBody>
-          <a:bodyPr/>
-          <a:lstStyle/>
-          <a:p>
-            <a:endParaRPr lang="es-MX"/>
-          </a:p>
-        </p:txBody>
-      </p:sp>
-      <p:sp>
-        <p:nvSpPr>
-          <p:cNvPr id="11" name="Text 9"/>
-          <p:cNvSpPr/>
-          <p:nvPr/>
-        </p:nvSpPr>
-        <p:spPr>
-          <a:xfrm>
-            <a:off x="1407795" y="5405795"/>
-            <a:ext cx="3649504" cy="320754"/>
-          </a:xfrm>
-          <a:prstGeom prst="rect">
-            <a:avLst/>
-          </a:prstGeom>
-          <a:noFill/>
-          <a:ln/>
-        </p:spPr>
-        <p:txBody>
-          <a:bodyPr wrap="none" lIns="0" tIns="0" rIns="0" bIns="0" rtlCol="0" anchor="t"/>
-          <a:lstStyle/>
-          <a:p>
-            <a:pPr marL="0" indent="0">
-              <a:lnSpc>
-                <a:spcPts val="2500"/>
-              </a:lnSpc>
-              <a:buNone/>
-            </a:pPr>
-            <a:r>
-              <a:rPr lang="en-US" sz="1650" dirty="0">
-                <a:solidFill>
-                  <a:srgbClr val="E2E6E9"/>
-                </a:solidFill>
-                <a:latin typeface="Source Sans Pro" pitchFamily="34" charset="0"/>
-                <a:ea typeface="Source Sans Pro" pitchFamily="34" charset="-122"/>
-                <a:cs typeface="Source Sans Pro" pitchFamily="34" charset="-120"/>
-              </a:rPr>
-              <a:t>Authentication Method</a:t>
-            </a:r>
-            <a:endParaRPr lang="en-US" sz="1650" dirty="0"/>
-          </a:p>
-        </p:txBody>
-      </p:sp>
-      <p:sp>
-        <p:nvSpPr>
-          <p:cNvPr id="12" name="Text 10"/>
-          <p:cNvSpPr/>
-          <p:nvPr/>
-        </p:nvSpPr>
-        <p:spPr>
-          <a:xfrm>
-            <a:off x="5492353" y="5405795"/>
-            <a:ext cx="3645694" cy="320754"/>
-          </a:xfrm>
-          <a:prstGeom prst="rect">
-            <a:avLst/>
-          </a:prstGeom>
-          <a:noFill/>
-          <a:ln/>
-        </p:spPr>
-        <p:txBody>
-          <a:bodyPr wrap="none" lIns="0" tIns="0" rIns="0" bIns="0" rtlCol="0" anchor="t"/>
-          <a:lstStyle/>
-          <a:p>
-            <a:pPr marL="0" indent="0">
-              <a:lnSpc>
-                <a:spcPts val="2500"/>
-              </a:lnSpc>
-              <a:buNone/>
-            </a:pPr>
-            <a:r>
-              <a:rPr lang="en-US" sz="1650" dirty="0">
-                <a:solidFill>
-                  <a:srgbClr val="E2E6E9"/>
-                </a:solidFill>
-                <a:latin typeface="Source Sans Pro" pitchFamily="34" charset="0"/>
-                <a:ea typeface="Source Sans Pro" pitchFamily="34" charset="-122"/>
-                <a:cs typeface="Source Sans Pro" pitchFamily="34" charset="-120"/>
-              </a:rPr>
-              <a:t>Form Login with Cookies</a:t>
-            </a:r>
-            <a:endParaRPr lang="en-US" sz="1650" dirty="0"/>
-          </a:p>
-        </p:txBody>
-      </p:sp>
-      <p:sp>
-        <p:nvSpPr>
-          <p:cNvPr id="13" name="Text 11"/>
-          <p:cNvSpPr/>
-          <p:nvPr/>
-        </p:nvSpPr>
-        <p:spPr>
-          <a:xfrm>
-            <a:off x="9573101" y="5405795"/>
-            <a:ext cx="3649504" cy="320754"/>
-          </a:xfrm>
-          <a:prstGeom prst="rect">
-            <a:avLst/>
-          </a:prstGeom>
-          <a:noFill/>
-          <a:ln/>
-        </p:spPr>
-        <p:txBody>
-          <a:bodyPr wrap="none" lIns="0" tIns="0" rIns="0" bIns="0" rtlCol="0" anchor="t"/>
-          <a:lstStyle/>
-          <a:p>
-            <a:pPr marL="0" indent="0">
-              <a:lnSpc>
-                <a:spcPts val="2500"/>
-              </a:lnSpc>
-              <a:buNone/>
-            </a:pPr>
-            <a:r>
-              <a:rPr lang="en-US" sz="1650" dirty="0">
-                <a:solidFill>
-                  <a:srgbClr val="E2E6E9"/>
-                </a:solidFill>
-                <a:latin typeface="Source Sans Pro" pitchFamily="34" charset="0"/>
-                <a:ea typeface="Source Sans Pro" pitchFamily="34" charset="-122"/>
-                <a:cs typeface="Source Sans Pro" pitchFamily="34" charset="-120"/>
-              </a:rPr>
-              <a:t>REST API with JWT</a:t>
-            </a:r>
-            <a:endParaRPr lang="en-US" sz="1650" dirty="0"/>
-          </a:p>
-        </p:txBody>
-      </p:sp>
-      <p:sp>
-        <p:nvSpPr>
-          <p:cNvPr id="14" name="Shape 12"/>
-          <p:cNvSpPr/>
-          <p:nvPr/>
-        </p:nvSpPr>
-        <p:spPr>
-          <a:xfrm>
-            <a:off x="1192649" y="5862399"/>
-            <a:ext cx="12243673" cy="592455"/>
-          </a:xfrm>
-          <a:prstGeom prst="rect">
-            <a:avLst/>
-          </a:prstGeom>
-          <a:solidFill>
-            <a:srgbClr val="FFFFFF">
-              <a:alpha val="4000"/>
-            </a:srgbClr>
-          </a:solidFill>
-          <a:ln/>
-        </p:spPr>
-        <p:txBody>
-          <a:bodyPr/>
-          <a:lstStyle/>
-          <a:p>
-            <a:endParaRPr lang="es-MX"/>
-          </a:p>
-        </p:txBody>
-      </p:sp>
-      <p:sp>
-        <p:nvSpPr>
-          <p:cNvPr id="15" name="Text 13"/>
-          <p:cNvSpPr/>
-          <p:nvPr/>
-        </p:nvSpPr>
-        <p:spPr>
-          <a:xfrm>
-            <a:off x="1407795" y="5998250"/>
-            <a:ext cx="3649504" cy="320754"/>
-          </a:xfrm>
-          <a:prstGeom prst="rect">
-            <a:avLst/>
-          </a:prstGeom>
-          <a:noFill/>
-          <a:ln/>
-        </p:spPr>
-        <p:txBody>
-          <a:bodyPr wrap="none" lIns="0" tIns="0" rIns="0" bIns="0" rtlCol="0" anchor="t"/>
-          <a:lstStyle/>
-          <a:p>
-            <a:pPr marL="0" indent="0">
-              <a:lnSpc>
-                <a:spcPts val="2500"/>
-              </a:lnSpc>
-              <a:buNone/>
-            </a:pPr>
-            <a:r>
-              <a:rPr lang="en-US" sz="1650" dirty="0">
-                <a:solidFill>
-                  <a:srgbClr val="E2E6E9"/>
-                </a:solidFill>
-                <a:latin typeface="Source Sans Pro" pitchFamily="34" charset="0"/>
-                <a:ea typeface="Source Sans Pro" pitchFamily="34" charset="-122"/>
-                <a:cs typeface="Source Sans Pro" pitchFamily="34" charset="-120"/>
-              </a:rPr>
-              <a:t>Session Management</a:t>
-            </a:r>
-            <a:endParaRPr lang="en-US" sz="1650" dirty="0"/>
-          </a:p>
-        </p:txBody>
-      </p:sp>
-      <p:sp>
-        <p:nvSpPr>
-          <p:cNvPr id="16" name="Text 14"/>
-          <p:cNvSpPr/>
-          <p:nvPr/>
-        </p:nvSpPr>
-        <p:spPr>
-          <a:xfrm>
-            <a:off x="5492353" y="5998250"/>
-            <a:ext cx="3645694" cy="320754"/>
-          </a:xfrm>
-          <a:prstGeom prst="rect">
-            <a:avLst/>
-          </a:prstGeom>
-          <a:noFill/>
-          <a:ln/>
-        </p:spPr>
-        <p:txBody>
-          <a:bodyPr wrap="none" lIns="0" tIns="0" rIns="0" bIns="0" rtlCol="0" anchor="t"/>
-          <a:lstStyle/>
-          <a:p>
-            <a:pPr marL="0" indent="0">
-              <a:lnSpc>
-                <a:spcPts val="2500"/>
-              </a:lnSpc>
-              <a:buNone/>
-            </a:pPr>
-            <a:r>
-              <a:rPr lang="en-US" sz="1650" dirty="0">
-                <a:solidFill>
-                  <a:srgbClr val="E2E6E9"/>
-                </a:solidFill>
-                <a:latin typeface="Source Sans Pro" pitchFamily="34" charset="0"/>
-                <a:ea typeface="Source Sans Pro" pitchFamily="34" charset="-122"/>
-                <a:cs typeface="Source Sans Pro" pitchFamily="34" charset="-120"/>
-              </a:rPr>
-              <a:t>Cookie-based</a:t>
-            </a:r>
-            <a:endParaRPr lang="en-US" sz="1650" dirty="0"/>
-          </a:p>
-        </p:txBody>
-      </p:sp>
-      <p:sp>
-        <p:nvSpPr>
-          <p:cNvPr id="17" name="Text 15"/>
-          <p:cNvSpPr/>
-          <p:nvPr/>
-        </p:nvSpPr>
-        <p:spPr>
-          <a:xfrm>
-            <a:off x="9573101" y="5998250"/>
-            <a:ext cx="3649504" cy="320754"/>
-          </a:xfrm>
-          <a:prstGeom prst="rect">
-            <a:avLst/>
-          </a:prstGeom>
-          <a:noFill/>
-          <a:ln/>
-        </p:spPr>
-        <p:txBody>
-          <a:bodyPr wrap="none" lIns="0" tIns="0" rIns="0" bIns="0" rtlCol="0" anchor="t"/>
-          <a:lstStyle/>
-          <a:p>
-            <a:pPr marL="0" indent="0">
-              <a:lnSpc>
-                <a:spcPts val="2500"/>
-              </a:lnSpc>
-              <a:buNone/>
-            </a:pPr>
-            <a:r>
-              <a:rPr lang="en-US" sz="1650" dirty="0">
-                <a:solidFill>
-                  <a:srgbClr val="E2E6E9"/>
-                </a:solidFill>
-                <a:latin typeface="Source Sans Pro" pitchFamily="34" charset="0"/>
-                <a:ea typeface="Source Sans Pro" pitchFamily="34" charset="-122"/>
-                <a:cs typeface="Source Sans Pro" pitchFamily="34" charset="-120"/>
-              </a:rPr>
-              <a:t>Token-based</a:t>
-            </a:r>
-            <a:endParaRPr lang="en-US" sz="1650" dirty="0"/>
-          </a:p>
-        </p:txBody>
-      </p:sp>
-      <p:sp>
-        <p:nvSpPr>
-          <p:cNvPr id="18" name="Shape 16"/>
-          <p:cNvSpPr/>
-          <p:nvPr/>
-        </p:nvSpPr>
-        <p:spPr>
-          <a:xfrm>
-            <a:off x="1192649" y="6454854"/>
-            <a:ext cx="12243673" cy="592455"/>
-          </a:xfrm>
-          <a:prstGeom prst="rect">
-            <a:avLst/>
-          </a:prstGeom>
-          <a:solidFill>
-            <a:srgbClr val="000000">
-              <a:alpha val="4000"/>
-            </a:srgbClr>
-          </a:solidFill>
-          <a:ln/>
-        </p:spPr>
-        <p:txBody>
-          <a:bodyPr/>
-          <a:lstStyle/>
-          <a:p>
-            <a:endParaRPr lang="es-MX"/>
-          </a:p>
-        </p:txBody>
-      </p:sp>
-      <p:sp>
-        <p:nvSpPr>
-          <p:cNvPr id="19" name="Text 17"/>
-          <p:cNvSpPr/>
-          <p:nvPr/>
-        </p:nvSpPr>
-        <p:spPr>
-          <a:xfrm>
-            <a:off x="1407795" y="6590705"/>
-            <a:ext cx="3649504" cy="320754"/>
-          </a:xfrm>
-          <a:prstGeom prst="rect">
-            <a:avLst/>
-          </a:prstGeom>
-          <a:noFill/>
-          <a:ln/>
-        </p:spPr>
-        <p:txBody>
-          <a:bodyPr wrap="none" lIns="0" tIns="0" rIns="0" bIns="0" rtlCol="0" anchor="t"/>
-          <a:lstStyle/>
-          <a:p>
-            <a:pPr marL="0" indent="0">
-              <a:lnSpc>
-                <a:spcPts val="2500"/>
-              </a:lnSpc>
-              <a:buNone/>
-            </a:pPr>
-            <a:r>
-              <a:rPr lang="en-US" sz="1650" dirty="0">
-                <a:solidFill>
-                  <a:srgbClr val="E2E6E9"/>
-                </a:solidFill>
-                <a:latin typeface="Source Sans Pro" pitchFamily="34" charset="0"/>
-                <a:ea typeface="Source Sans Pro" pitchFamily="34" charset="-122"/>
-                <a:cs typeface="Source Sans Pro" pitchFamily="34" charset="-120"/>
-              </a:rPr>
-              <a:t>Additional Security</a:t>
-            </a:r>
-            <a:endParaRPr lang="en-US" sz="1650" dirty="0"/>
-          </a:p>
-        </p:txBody>
-      </p:sp>
-      <p:sp>
-        <p:nvSpPr>
-          <p:cNvPr id="20" name="Text 18"/>
-          <p:cNvSpPr/>
-          <p:nvPr/>
-        </p:nvSpPr>
-        <p:spPr>
-          <a:xfrm>
-            <a:off x="5492353" y="6590705"/>
-            <a:ext cx="3645694" cy="320754"/>
-          </a:xfrm>
-          <a:prstGeom prst="rect">
-            <a:avLst/>
-          </a:prstGeom>
-          <a:noFill/>
-          <a:ln/>
-        </p:spPr>
-        <p:txBody>
-          <a:bodyPr wrap="none" lIns="0" tIns="0" rIns="0" bIns="0" rtlCol="0" anchor="t"/>
-          <a:lstStyle/>
-          <a:p>
-            <a:pPr marL="0" indent="0">
-              <a:lnSpc>
-                <a:spcPts val="2500"/>
-              </a:lnSpc>
-              <a:buNone/>
-            </a:pPr>
-            <a:r>
-              <a:rPr lang="en-US" sz="1650" dirty="0">
-                <a:solidFill>
-                  <a:srgbClr val="E2E6E9"/>
-                </a:solidFill>
-                <a:latin typeface="Source Sans Pro" pitchFamily="34" charset="0"/>
-                <a:ea typeface="Source Sans Pro" pitchFamily="34" charset="-122"/>
-                <a:cs typeface="Source Sans Pro" pitchFamily="34" charset="-120"/>
-              </a:rPr>
-              <a:t>None</a:t>
-            </a:r>
-            <a:endParaRPr lang="en-US" sz="1650" dirty="0"/>
-          </a:p>
-        </p:txBody>
-      </p:sp>
-      <p:sp>
-        <p:nvSpPr>
-          <p:cNvPr id="21" name="Text 19"/>
-          <p:cNvSpPr/>
-          <p:nvPr/>
-        </p:nvSpPr>
-        <p:spPr>
-          <a:xfrm>
-            <a:off x="9573101" y="6590705"/>
-            <a:ext cx="3649504" cy="320754"/>
-          </a:xfrm>
-          <a:prstGeom prst="rect">
-            <a:avLst/>
-          </a:prstGeom>
-          <a:noFill/>
-          <a:ln/>
-        </p:spPr>
-        <p:txBody>
-          <a:bodyPr wrap="none" lIns="0" tIns="0" rIns="0" bIns="0" rtlCol="0" anchor="t"/>
-          <a:lstStyle/>
-          <a:p>
-            <a:pPr marL="0" indent="0">
-              <a:lnSpc>
-                <a:spcPts val="2500"/>
-              </a:lnSpc>
-              <a:buNone/>
-            </a:pPr>
-            <a:r>
-              <a:rPr lang="en-US" sz="1650" dirty="0">
-                <a:solidFill>
-                  <a:srgbClr val="E2E6E9"/>
-                </a:solidFill>
-                <a:latin typeface="Source Sans Pro" pitchFamily="34" charset="0"/>
-                <a:ea typeface="Source Sans Pro" pitchFamily="34" charset="-122"/>
-                <a:cs typeface="Source Sans Pro" pitchFamily="34" charset="-120"/>
-              </a:rPr>
-              <a:t>5-attempt lockout</a:t>
-            </a:r>
-            <a:endParaRPr lang="en-US" sz="1650" dirty="0"/>
-          </a:p>
-        </p:txBody>
-      </p:sp>
-      <p:sp>
-        <p:nvSpPr>
-          <p:cNvPr id="22" name="Shape 20"/>
-          <p:cNvSpPr/>
-          <p:nvPr/>
-        </p:nvSpPr>
-        <p:spPr>
-          <a:xfrm>
-            <a:off x="1192649" y="7047309"/>
-            <a:ext cx="12243673" cy="592455"/>
-          </a:xfrm>
-          <a:prstGeom prst="rect">
-            <a:avLst/>
-          </a:prstGeom>
-          <a:solidFill>
-            <a:srgbClr val="FFFFFF">
-              <a:alpha val="4000"/>
-            </a:srgbClr>
-          </a:solidFill>
-          <a:ln/>
-        </p:spPr>
-        <p:txBody>
-          <a:bodyPr/>
-          <a:lstStyle/>
-          <a:p>
-            <a:endParaRPr lang="es-MX"/>
-          </a:p>
-        </p:txBody>
-      </p:sp>
-      <p:sp>
-        <p:nvSpPr>
-          <p:cNvPr id="23" name="Text 21"/>
-          <p:cNvSpPr/>
-          <p:nvPr/>
-        </p:nvSpPr>
-        <p:spPr>
-          <a:xfrm>
-            <a:off x="1407795" y="7183160"/>
-            <a:ext cx="3649504" cy="320754"/>
-          </a:xfrm>
-          <a:prstGeom prst="rect">
-            <a:avLst/>
-          </a:prstGeom>
-          <a:noFill/>
-          <a:ln/>
-        </p:spPr>
-        <p:txBody>
-          <a:bodyPr wrap="none" lIns="0" tIns="0" rIns="0" bIns="0" rtlCol="0" anchor="t"/>
-          <a:lstStyle/>
-          <a:p>
-            <a:pPr marL="0" indent="0">
-              <a:lnSpc>
-                <a:spcPts val="2500"/>
-              </a:lnSpc>
-              <a:buNone/>
-            </a:pPr>
-            <a:r>
-              <a:rPr lang="en-US" sz="1650" dirty="0">
-                <a:solidFill>
-                  <a:srgbClr val="E2E6E9"/>
-                </a:solidFill>
-                <a:latin typeface="Source Sans Pro" pitchFamily="34" charset="0"/>
-                <a:ea typeface="Source Sans Pro" pitchFamily="34" charset="-122"/>
-                <a:cs typeface="Source Sans Pro" pitchFamily="34" charset="-120"/>
-              </a:rPr>
-              <a:t>API Structure</a:t>
-            </a:r>
-            <a:endParaRPr lang="en-US" sz="1650" dirty="0"/>
-          </a:p>
-        </p:txBody>
-      </p:sp>
-      <p:sp>
-        <p:nvSpPr>
-          <p:cNvPr id="24" name="Text 22"/>
-          <p:cNvSpPr/>
-          <p:nvPr/>
-        </p:nvSpPr>
-        <p:spPr>
-          <a:xfrm>
-            <a:off x="5492353" y="7183160"/>
-            <a:ext cx="3645694" cy="320754"/>
-          </a:xfrm>
-          <a:prstGeom prst="rect">
-            <a:avLst/>
-          </a:prstGeom>
-          <a:noFill/>
-          <a:ln/>
-        </p:spPr>
-        <p:txBody>
-          <a:bodyPr wrap="none" lIns="0" tIns="0" rIns="0" bIns="0" rtlCol="0" anchor="t"/>
-          <a:lstStyle/>
-          <a:p>
-            <a:pPr marL="0" indent="0">
-              <a:lnSpc>
-                <a:spcPts val="2500"/>
-              </a:lnSpc>
-              <a:buNone/>
-            </a:pPr>
-            <a:r>
-              <a:rPr lang="en-US" sz="1650" dirty="0">
-                <a:solidFill>
-                  <a:srgbClr val="E2E6E9"/>
-                </a:solidFill>
-                <a:latin typeface="Source Sans Pro" pitchFamily="34" charset="0"/>
-                <a:ea typeface="Source Sans Pro" pitchFamily="34" charset="-122"/>
-                <a:cs typeface="Source Sans Pro" pitchFamily="34" charset="-120"/>
-              </a:rPr>
-              <a:t>Traditional</a:t>
-            </a:r>
-            <a:endParaRPr lang="en-US" sz="1650" dirty="0"/>
-          </a:p>
-        </p:txBody>
-      </p:sp>
-      <p:sp>
-        <p:nvSpPr>
-          <p:cNvPr id="25" name="Text 23"/>
-          <p:cNvSpPr/>
-          <p:nvPr/>
-        </p:nvSpPr>
-        <p:spPr>
-          <a:xfrm>
-            <a:off x="9573101" y="7183160"/>
-            <a:ext cx="3649504" cy="320754"/>
-          </a:xfrm>
-          <a:prstGeom prst="rect">
-            <a:avLst/>
-          </a:prstGeom>
-          <a:noFill/>
-          <a:ln/>
-        </p:spPr>
-        <p:txBody>
-          <a:bodyPr wrap="none" lIns="0" tIns="0" rIns="0" bIns="0" rtlCol="0" anchor="t"/>
-          <a:lstStyle/>
-          <a:p>
-            <a:pPr marL="0" indent="0">
-              <a:lnSpc>
-                <a:spcPts val="2500"/>
-              </a:lnSpc>
-              <a:buNone/>
-            </a:pPr>
-            <a:r>
-              <a:rPr lang="en-US" sz="1650" dirty="0">
-                <a:solidFill>
-                  <a:srgbClr val="E2E6E9"/>
-                </a:solidFill>
-                <a:latin typeface="Source Sans Pro" pitchFamily="34" charset="0"/>
-                <a:ea typeface="Source Sans Pro" pitchFamily="34" charset="-122"/>
-                <a:cs typeface="Source Sans Pro" pitchFamily="34" charset="-120"/>
-              </a:rPr>
-              <a:t>RESTful</a:t>
-            </a:r>
-            <a:endParaRPr lang="en-US" sz="1650" dirty="0"/>
-          </a:p>
-        </p:txBody>
-      </p:sp>
-    </p:spTree>
-  </p:cSld>
-  <p:clrMapOvr>
-    <a:masterClrMapping/>
-  </p:clrMapOvr>
-</p:sld>
-</file>
-
-<file path=ppt/slides/slide9.xml><?xml version="1.0" encoding="utf-8"?>
 <p:sld xmlns:a="http://schemas.openxmlformats.org/drawingml/2006/main" xmlns:r="http://schemas.openxmlformats.org/officeDocument/2006/relationships" xmlns:p="http://schemas.openxmlformats.org/presentationml/2006/main">
   <p:cSld name="Slide 8">
     <p:spTree>
@@ -6065,48 +5998,6 @@
       </p:sp>
       <p:sp>
         <p:nvSpPr>
-          <p:cNvPr id="4" name="Text 2"/>
-          <p:cNvSpPr/>
-          <p:nvPr/>
-        </p:nvSpPr>
-        <p:spPr>
-          <a:xfrm>
-            <a:off x="1185029" y="2772966"/>
-            <a:ext cx="12260223" cy="1243489"/>
-          </a:xfrm>
-          <a:prstGeom prst="rect">
-            <a:avLst/>
-          </a:prstGeom>
-          <a:noFill/>
-          <a:ln/>
-        </p:spPr>
-        <p:txBody>
-          <a:bodyPr wrap="square" lIns="0" tIns="0" rIns="0" bIns="0" rtlCol="0" anchor="t"/>
-          <a:lstStyle/>
-          <a:p>
-            <a:pPr marL="0" indent="0">
-              <a:lnSpc>
-                <a:spcPts val="2400"/>
-              </a:lnSpc>
-              <a:buNone/>
-            </a:pPr>
-            <a:r>
-              <a:rPr lang="en-US" sz="1600" dirty="0">
-                <a:solidFill>
-                  <a:srgbClr val="E2E6E9"/>
-                </a:solidFill>
-                <a:latin typeface="Source Sans Pro" pitchFamily="34" charset="0"/>
-                <a:ea typeface="Source Sans Pro" pitchFamily="34" charset="-122"/>
-                <a:cs typeface="Source Sans Pro" pitchFamily="34" charset="-120"/>
-              </a:rPr>
-              <a:t>Looking ahead, we envision expanding the framework to encompass a broader range of attack types beyond brute force attempts. This expansion will require the development of more sophisticated simulation environments and the integration of additional defensive technologies. Furthermore, we aim to enhance the realism of our password generation algorithms, potentially incorporating machine learning models to create context-aware, user-type-specific passwords that more accurately reflect real-world scenarios.</a:t>
-            </a:r>
-            <a:endParaRPr lang="en-US" sz="1600" dirty="0"/>
-          </a:p>
-        </p:txBody>
-      </p:sp>
-      <p:sp>
-        <p:nvSpPr>
           <p:cNvPr id="5" name="Shape 3"/>
           <p:cNvSpPr/>
           <p:nvPr/>
@@ -6522,7 +6413,7 @@
                 <a:ea typeface="Montserrat Bold" pitchFamily="34" charset="-122"/>
                 <a:cs typeface="Montserrat Bold" pitchFamily="34" charset="-120"/>
               </a:rPr>
-              <a:t>Enhanced Password Realism</a:t>
+              <a:t>LLM Integration</a:t>
             </a:r>
             <a:endParaRPr lang="en-US" sz="1850" dirty="0"/>
           </a:p>
@@ -6564,7 +6455,17 @@
                 <a:ea typeface="Source Sans Pro" pitchFamily="34" charset="-122"/>
                 <a:cs typeface="Source Sans Pro" pitchFamily="34" charset="-120"/>
               </a:rPr>
-              <a:t>Implement AI-driven password generation that considers user demographics, language patterns, and common password creation behaviors.</a:t>
+              <a:t>As this version just focus mainly on RL models, this same focus could be use to train LLM models as </a:t>
+            </a:r>
+            <a:r>
+              <a:rPr lang="en-US" sz="1600" dirty="0">
+                <a:solidFill>
+                  <a:srgbClr val="E2E6E9"/>
+                </a:solidFill>
+                <a:latin typeface="Source Sans Pro" pitchFamily="34" charset="0"/>
+                <a:ea typeface="Source Sans Pro" pitchFamily="34" charset="-122"/>
+              </a:rPr>
+              <a:t>agentic AI frameworks, or other compound or RAG LLM implementations</a:t>
             </a:r>
             <a:endParaRPr lang="en-US" sz="1600" dirty="0"/>
           </a:p>

</xml_diff>